<commit_message>
quelques corrections pour le memo python
</commit_message>
<xml_diff>
--- a/01_python/cours/04_elif_fonction.pptx
+++ b/01_python/cours/04_elif_fonction.pptx
@@ -1618,14 +1618,14 @@
           <a:effectLst/>
           <a:extLst>
             <a:ext uri="{909E8E84-426E-40dd-AFC4-6F175D3DCCD1}">
-              <a14:hiddenFill xmlns:a14="http://schemas.microsoft.com/office/drawing/2010/main" xmlns="">
+              <a14:hiddenFill xmlns="" xmlns:a14="http://schemas.microsoft.com/office/drawing/2010/main">
                 <a:solidFill>
                   <a:schemeClr val="accent1"/>
                 </a:solidFill>
               </a14:hiddenFill>
             </a:ext>
             <a:ext uri="{91240B29-F687-4f45-9708-019B960494DF}">
-              <a14:hiddenLine xmlns:a14="http://schemas.microsoft.com/office/drawing/2010/main" xmlns="" w="9525">
+              <a14:hiddenLine xmlns="" xmlns:a14="http://schemas.microsoft.com/office/drawing/2010/main" w="9525">
                 <a:solidFill>
                   <a:schemeClr val="tx1"/>
                 </a:solidFill>
@@ -1635,7 +1635,7 @@
               </a14:hiddenLine>
             </a:ext>
             <a:ext uri="{AF507438-7753-43e0-B8FC-AC1667EBCBE1}">
-              <a14:hiddenEffects xmlns:a14="http://schemas.microsoft.com/office/drawing/2010/main" xmlns="">
+              <a14:hiddenEffects xmlns="" xmlns:a14="http://schemas.microsoft.com/office/drawing/2010/main">
                 <a:effectLst>
                   <a:outerShdw blurRad="63500" dist="38099" dir="2700000" algn="ctr" rotWithShape="0">
                     <a:schemeClr val="bg2">
@@ -1646,7 +1646,7 @@
               </a14:hiddenEffects>
             </a:ext>
             <a:ext uri="{FAA26D3D-D897-4be2-8F04-BA451C77F1D7}">
-              <ma14:placeholderFlag xmlns:ma14="http://schemas.microsoft.com/office/mac/drawingml/2011/main" xmlns="" val="1"/>
+              <ma14:placeholderFlag xmlns="" xmlns:ma14="http://schemas.microsoft.com/office/mac/drawingml/2011/main" val="1"/>
             </a:ext>
           </a:extLst>
         </p:spPr>
@@ -1691,14 +1691,14 @@
           <a:effectLst/>
           <a:extLst>
             <a:ext uri="{909E8E84-426E-40dd-AFC4-6F175D3DCCD1}">
-              <a14:hiddenFill xmlns:a14="http://schemas.microsoft.com/office/drawing/2010/main" xmlns="">
+              <a14:hiddenFill xmlns="" xmlns:a14="http://schemas.microsoft.com/office/drawing/2010/main">
                 <a:solidFill>
                   <a:schemeClr val="accent1"/>
                 </a:solidFill>
               </a14:hiddenFill>
             </a:ext>
             <a:ext uri="{91240B29-F687-4f45-9708-019B960494DF}">
-              <a14:hiddenLine xmlns:a14="http://schemas.microsoft.com/office/drawing/2010/main" xmlns="" w="9525">
+              <a14:hiddenLine xmlns="" xmlns:a14="http://schemas.microsoft.com/office/drawing/2010/main" w="9525">
                 <a:solidFill>
                   <a:schemeClr val="tx1"/>
                 </a:solidFill>
@@ -1708,7 +1708,7 @@
               </a14:hiddenLine>
             </a:ext>
             <a:ext uri="{AF507438-7753-43e0-B8FC-AC1667EBCBE1}">
-              <a14:hiddenEffects xmlns:a14="http://schemas.microsoft.com/office/drawing/2010/main" xmlns="">
+              <a14:hiddenEffects xmlns="" xmlns:a14="http://schemas.microsoft.com/office/drawing/2010/main">
                 <a:effectLst>
                   <a:outerShdw blurRad="63500" dist="38099" dir="2700000" algn="ctr" rotWithShape="0">
                     <a:schemeClr val="bg2">
@@ -1719,7 +1719,7 @@
               </a14:hiddenEffects>
             </a:ext>
             <a:ext uri="{FAA26D3D-D897-4be2-8F04-BA451C77F1D7}">
-              <ma14:placeholderFlag xmlns:ma14="http://schemas.microsoft.com/office/mac/drawingml/2011/main" xmlns="" val="1"/>
+              <ma14:placeholderFlag xmlns="" xmlns:ma14="http://schemas.microsoft.com/office/mac/drawingml/2011/main" val="1"/>
             </a:ext>
           </a:extLst>
         </p:spPr>
@@ -1764,14 +1764,14 @@
           <a:effectLst/>
           <a:extLst>
             <a:ext uri="{909E8E84-426E-40dd-AFC4-6F175D3DCCD1}">
-              <a14:hiddenFill xmlns:a14="http://schemas.microsoft.com/office/drawing/2010/main" xmlns="">
+              <a14:hiddenFill xmlns="" xmlns:a14="http://schemas.microsoft.com/office/drawing/2010/main">
                 <a:solidFill>
                   <a:schemeClr val="accent1"/>
                 </a:solidFill>
               </a14:hiddenFill>
             </a:ext>
             <a:ext uri="{91240B29-F687-4f45-9708-019B960494DF}">
-              <a14:hiddenLine xmlns:a14="http://schemas.microsoft.com/office/drawing/2010/main" xmlns="" w="9525">
+              <a14:hiddenLine xmlns="" xmlns:a14="http://schemas.microsoft.com/office/drawing/2010/main" w="9525">
                 <a:solidFill>
                   <a:schemeClr val="tx1"/>
                 </a:solidFill>
@@ -1781,7 +1781,7 @@
               </a14:hiddenLine>
             </a:ext>
             <a:ext uri="{AF507438-7753-43e0-B8FC-AC1667EBCBE1}">
-              <a14:hiddenEffects xmlns:a14="http://schemas.microsoft.com/office/drawing/2010/main" xmlns="">
+              <a14:hiddenEffects xmlns="" xmlns:a14="http://schemas.microsoft.com/office/drawing/2010/main">
                 <a:effectLst>
                   <a:outerShdw blurRad="63500" dist="38099" dir="2700000" algn="ctr" rotWithShape="0">
                     <a:schemeClr val="bg2">
@@ -1792,7 +1792,7 @@
               </a14:hiddenEffects>
             </a:ext>
             <a:ext uri="{FAA26D3D-D897-4be2-8F04-BA451C77F1D7}">
-              <ma14:placeholderFlag xmlns:ma14="http://schemas.microsoft.com/office/mac/drawingml/2011/main" xmlns="" val="1"/>
+              <ma14:placeholderFlag xmlns="" xmlns:ma14="http://schemas.microsoft.com/office/mac/drawingml/2011/main" val="1"/>
             </a:ext>
           </a:extLst>
         </p:spPr>
@@ -1837,14 +1837,14 @@
           <a:effectLst/>
           <a:extLst>
             <a:ext uri="{909E8E84-426E-40dd-AFC4-6F175D3DCCD1}">
-              <a14:hiddenFill xmlns:a14="http://schemas.microsoft.com/office/drawing/2010/main" xmlns="">
+              <a14:hiddenFill xmlns="" xmlns:a14="http://schemas.microsoft.com/office/drawing/2010/main">
                 <a:solidFill>
                   <a:schemeClr val="accent1"/>
                 </a:solidFill>
               </a14:hiddenFill>
             </a:ext>
             <a:ext uri="{91240B29-F687-4f45-9708-019B960494DF}">
-              <a14:hiddenLine xmlns:a14="http://schemas.microsoft.com/office/drawing/2010/main" xmlns="" w="9525">
+              <a14:hiddenLine xmlns="" xmlns:a14="http://schemas.microsoft.com/office/drawing/2010/main" w="9525">
                 <a:solidFill>
                   <a:schemeClr val="tx1"/>
                 </a:solidFill>
@@ -1854,7 +1854,7 @@
               </a14:hiddenLine>
             </a:ext>
             <a:ext uri="{AF507438-7753-43e0-B8FC-AC1667EBCBE1}">
-              <a14:hiddenEffects xmlns:a14="http://schemas.microsoft.com/office/drawing/2010/main" xmlns="">
+              <a14:hiddenEffects xmlns="" xmlns:a14="http://schemas.microsoft.com/office/drawing/2010/main">
                 <a:effectLst>
                   <a:outerShdw blurRad="63500" dist="38099" dir="2700000" algn="ctr" rotWithShape="0">
                     <a:schemeClr val="bg2">
@@ -1865,7 +1865,7 @@
               </a14:hiddenEffects>
             </a:ext>
             <a:ext uri="{FAA26D3D-D897-4be2-8F04-BA451C77F1D7}">
-              <ma14:placeholderFlag xmlns:ma14="http://schemas.microsoft.com/office/mac/drawingml/2011/main" xmlns="" val="1"/>
+              <ma14:placeholderFlag xmlns="" xmlns:ma14="http://schemas.microsoft.com/office/mac/drawingml/2011/main" val="1"/>
             </a:ext>
           </a:extLst>
         </p:spPr>
@@ -1951,14 +1951,14 @@
           <a:effectLst/>
           <a:extLst>
             <a:ext uri="{909E8E84-426E-40dd-AFC4-6F175D3DCCD1}">
-              <a14:hiddenFill xmlns:a14="http://schemas.microsoft.com/office/drawing/2010/main" xmlns="">
+              <a14:hiddenFill xmlns="" xmlns:a14="http://schemas.microsoft.com/office/drawing/2010/main">
                 <a:solidFill>
                   <a:schemeClr val="accent1"/>
                 </a:solidFill>
               </a14:hiddenFill>
             </a:ext>
             <a:ext uri="{91240B29-F687-4f45-9708-019B960494DF}">
-              <a14:hiddenLine xmlns:a14="http://schemas.microsoft.com/office/drawing/2010/main" xmlns="" w="9525">
+              <a14:hiddenLine xmlns="" xmlns:a14="http://schemas.microsoft.com/office/drawing/2010/main" w="9525">
                 <a:solidFill>
                   <a:schemeClr val="tx1"/>
                 </a:solidFill>
@@ -1968,7 +1968,7 @@
               </a14:hiddenLine>
             </a:ext>
             <a:ext uri="{AF507438-7753-43e0-B8FC-AC1667EBCBE1}">
-              <a14:hiddenEffects xmlns:a14="http://schemas.microsoft.com/office/drawing/2010/main" xmlns="">
+              <a14:hiddenEffects xmlns="" xmlns:a14="http://schemas.microsoft.com/office/drawing/2010/main">
                 <a:effectLst>
                   <a:outerShdw blurRad="63500" dist="38099" dir="2700000" algn="ctr" rotWithShape="0">
                     <a:schemeClr val="bg2">
@@ -1979,7 +1979,7 @@
               </a14:hiddenEffects>
             </a:ext>
             <a:ext uri="{FAA26D3D-D897-4be2-8F04-BA451C77F1D7}">
-              <ma14:placeholderFlag xmlns:ma14="http://schemas.microsoft.com/office/mac/drawingml/2011/main" xmlns="" val="1"/>
+              <ma14:placeholderFlag xmlns="" xmlns:ma14="http://schemas.microsoft.com/office/mac/drawingml/2011/main" val="1"/>
             </a:ext>
           </a:extLst>
         </p:spPr>
@@ -2024,14 +2024,14 @@
           <a:effectLst/>
           <a:extLst>
             <a:ext uri="{909E8E84-426E-40dd-AFC4-6F175D3DCCD1}">
-              <a14:hiddenFill xmlns:a14="http://schemas.microsoft.com/office/drawing/2010/main" xmlns="">
+              <a14:hiddenFill xmlns="" xmlns:a14="http://schemas.microsoft.com/office/drawing/2010/main">
                 <a:solidFill>
                   <a:schemeClr val="accent1"/>
                 </a:solidFill>
               </a14:hiddenFill>
             </a:ext>
             <a:ext uri="{91240B29-F687-4f45-9708-019B960494DF}">
-              <a14:hiddenLine xmlns:a14="http://schemas.microsoft.com/office/drawing/2010/main" xmlns="" w="9525">
+              <a14:hiddenLine xmlns="" xmlns:a14="http://schemas.microsoft.com/office/drawing/2010/main" w="9525">
                 <a:solidFill>
                   <a:schemeClr val="tx1"/>
                 </a:solidFill>
@@ -2041,7 +2041,7 @@
               </a14:hiddenLine>
             </a:ext>
             <a:ext uri="{AF507438-7753-43e0-B8FC-AC1667EBCBE1}">
-              <a14:hiddenEffects xmlns:a14="http://schemas.microsoft.com/office/drawing/2010/main" xmlns="">
+              <a14:hiddenEffects xmlns="" xmlns:a14="http://schemas.microsoft.com/office/drawing/2010/main">
                 <a:effectLst>
                   <a:outerShdw blurRad="63500" dist="38099" dir="2700000" algn="ctr" rotWithShape="0">
                     <a:schemeClr val="bg2">
@@ -2052,7 +2052,7 @@
               </a14:hiddenEffects>
             </a:ext>
             <a:ext uri="{FAA26D3D-D897-4be2-8F04-BA451C77F1D7}">
-              <ma14:placeholderFlag xmlns:ma14="http://schemas.microsoft.com/office/mac/drawingml/2011/main" xmlns="" val="1"/>
+              <ma14:placeholderFlag xmlns="" xmlns:ma14="http://schemas.microsoft.com/office/mac/drawingml/2011/main" val="1"/>
             </a:ext>
           </a:extLst>
         </p:spPr>
@@ -2102,7 +2102,7 @@
           <a:effectLst/>
           <a:extLst>
             <a:ext uri="{AF507438-7753-43e0-B8FC-AC1667EBCBE1}">
-              <a14:hiddenEffects xmlns:a14="http://schemas.microsoft.com/office/drawing/2010/main" xmlns="">
+              <a14:hiddenEffects xmlns="" xmlns:a14="http://schemas.microsoft.com/office/drawing/2010/main">
                 <a:effectLst>
                   <a:outerShdw blurRad="63500" dist="38099" dir="2700000" algn="ctr" rotWithShape="0">
                     <a:srgbClr val="000000">
@@ -2113,7 +2113,7 @@
               </a14:hiddenEffects>
             </a:ext>
             <a:ext uri="{53640926-AAD7-44d8-BBD7-CCE9431645EC}">
-              <a14:shadowObscured xmlns:a14="http://schemas.microsoft.com/office/drawing/2010/main" xmlns="" val="1"/>
+              <a14:shadowObscured xmlns="" xmlns:a14="http://schemas.microsoft.com/office/drawing/2010/main" val="1"/>
             </a:ext>
           </a:extLst>
         </p:spPr>
@@ -2143,14 +2143,14 @@
           <a:effectLst/>
           <a:extLst>
             <a:ext uri="{909E8E84-426E-40dd-AFC4-6F175D3DCCD1}">
-              <a14:hiddenFill xmlns:a14="http://schemas.microsoft.com/office/drawing/2010/main" xmlns="">
+              <a14:hiddenFill xmlns="" xmlns:a14="http://schemas.microsoft.com/office/drawing/2010/main">
                 <a:solidFill>
                   <a:schemeClr val="accent1"/>
                 </a:solidFill>
               </a14:hiddenFill>
             </a:ext>
             <a:ext uri="{91240B29-F687-4f45-9708-019B960494DF}">
-              <a14:hiddenLine xmlns:a14="http://schemas.microsoft.com/office/drawing/2010/main" xmlns="" w="9525">
+              <a14:hiddenLine xmlns="" xmlns:a14="http://schemas.microsoft.com/office/drawing/2010/main" w="9525">
                 <a:solidFill>
                   <a:schemeClr val="tx1"/>
                 </a:solidFill>
@@ -2160,7 +2160,7 @@
               </a14:hiddenLine>
             </a:ext>
             <a:ext uri="{AF507438-7753-43e0-B8FC-AC1667EBCBE1}">
-              <a14:hiddenEffects xmlns:a14="http://schemas.microsoft.com/office/drawing/2010/main" xmlns="">
+              <a14:hiddenEffects xmlns="" xmlns:a14="http://schemas.microsoft.com/office/drawing/2010/main">
                 <a:effectLst>
                   <a:outerShdw blurRad="63500" dist="38099" dir="2700000" algn="ctr" rotWithShape="0">
                     <a:schemeClr val="bg2">
@@ -2171,7 +2171,7 @@
               </a14:hiddenEffects>
             </a:ext>
             <a:ext uri="{FAA26D3D-D897-4be2-8F04-BA451C77F1D7}">
-              <ma14:placeholderFlag xmlns:ma14="http://schemas.microsoft.com/office/mac/drawingml/2011/main" xmlns="" val="1"/>
+              <ma14:placeholderFlag xmlns="" xmlns:ma14="http://schemas.microsoft.com/office/mac/drawingml/2011/main" val="1"/>
             </a:ext>
           </a:extLst>
         </p:spPr>
@@ -2244,14 +2244,14 @@
           <a:effectLst/>
           <a:extLst>
             <a:ext uri="{909E8E84-426E-40dd-AFC4-6F175D3DCCD1}">
-              <a14:hiddenFill xmlns:a14="http://schemas.microsoft.com/office/drawing/2010/main" xmlns="">
+              <a14:hiddenFill xmlns="" xmlns:a14="http://schemas.microsoft.com/office/drawing/2010/main">
                 <a:solidFill>
                   <a:schemeClr val="accent1"/>
                 </a:solidFill>
               </a14:hiddenFill>
             </a:ext>
             <a:ext uri="{91240B29-F687-4f45-9708-019B960494DF}">
-              <a14:hiddenLine xmlns:a14="http://schemas.microsoft.com/office/drawing/2010/main" xmlns="" w="9525">
+              <a14:hiddenLine xmlns="" xmlns:a14="http://schemas.microsoft.com/office/drawing/2010/main" w="9525">
                 <a:solidFill>
                   <a:schemeClr val="tx1"/>
                 </a:solidFill>
@@ -2261,7 +2261,7 @@
               </a14:hiddenLine>
             </a:ext>
             <a:ext uri="{AF507438-7753-43e0-B8FC-AC1667EBCBE1}">
-              <a14:hiddenEffects xmlns:a14="http://schemas.microsoft.com/office/drawing/2010/main" xmlns="">
+              <a14:hiddenEffects xmlns="" xmlns:a14="http://schemas.microsoft.com/office/drawing/2010/main">
                 <a:effectLst>
                   <a:outerShdw blurRad="63500" dist="38099" dir="2700000" algn="ctr" rotWithShape="0">
                     <a:schemeClr val="bg2">
@@ -2272,7 +2272,7 @@
               </a14:hiddenEffects>
             </a:ext>
             <a:ext uri="{FAA26D3D-D897-4be2-8F04-BA451C77F1D7}">
-              <ma14:placeholderFlag xmlns:ma14="http://schemas.microsoft.com/office/mac/drawingml/2011/main" xmlns="" val="1"/>
+              <ma14:placeholderFlag xmlns="" xmlns:ma14="http://schemas.microsoft.com/office/mac/drawingml/2011/main" val="1"/>
             </a:ext>
           </a:extLst>
         </p:spPr>
@@ -2317,14 +2317,14 @@
           <a:effectLst/>
           <a:extLst>
             <a:ext uri="{909E8E84-426E-40dd-AFC4-6F175D3DCCD1}">
-              <a14:hiddenFill xmlns:a14="http://schemas.microsoft.com/office/drawing/2010/main" xmlns="">
+              <a14:hiddenFill xmlns="" xmlns:a14="http://schemas.microsoft.com/office/drawing/2010/main">
                 <a:solidFill>
                   <a:schemeClr val="accent1"/>
                 </a:solidFill>
               </a14:hiddenFill>
             </a:ext>
             <a:ext uri="{91240B29-F687-4f45-9708-019B960494DF}">
-              <a14:hiddenLine xmlns:a14="http://schemas.microsoft.com/office/drawing/2010/main" xmlns="" w="9525">
+              <a14:hiddenLine xmlns="" xmlns:a14="http://schemas.microsoft.com/office/drawing/2010/main" w="9525">
                 <a:solidFill>
                   <a:schemeClr val="tx1"/>
                 </a:solidFill>
@@ -2334,7 +2334,7 @@
               </a14:hiddenLine>
             </a:ext>
             <a:ext uri="{AF507438-7753-43e0-B8FC-AC1667EBCBE1}">
-              <a14:hiddenEffects xmlns:a14="http://schemas.microsoft.com/office/drawing/2010/main" xmlns="">
+              <a14:hiddenEffects xmlns="" xmlns:a14="http://schemas.microsoft.com/office/drawing/2010/main">
                 <a:effectLst>
                   <a:outerShdw blurRad="63500" dist="38099" dir="2700000" algn="ctr" rotWithShape="0">
                     <a:schemeClr val="bg2">
@@ -2345,7 +2345,7 @@
               </a14:hiddenEffects>
             </a:ext>
             <a:ext uri="{FAA26D3D-D897-4be2-8F04-BA451C77F1D7}">
-              <ma14:placeholderFlag xmlns:ma14="http://schemas.microsoft.com/office/mac/drawingml/2011/main" xmlns="" val="1"/>
+              <ma14:placeholderFlag xmlns="" xmlns:ma14="http://schemas.microsoft.com/office/mac/drawingml/2011/main" val="1"/>
             </a:ext>
           </a:extLst>
         </p:spPr>
@@ -9100,11 +9100,11 @@
             <p:nvPr/>
           </p:nvCxnSpPr>
           <p:spPr>
-            <a:xfrm>
-              <a:off x="867779" y="6661985"/>
-              <a:ext cx="850813" cy="169900"/>
+            <a:xfrm rot="16200000" flipH="1">
+              <a:off x="1208235" y="6321528"/>
+              <a:ext cx="169900" cy="850813"/>
             </a:xfrm>
-            <a:prstGeom prst="straightConnector1">
+            <a:prstGeom prst="bentConnector2">
               <a:avLst/>
             </a:prstGeom>
             <a:ln>
@@ -9276,17 +9276,21 @@
               </a:extLst>
             </p:cNvPr>
             <p:cNvCxnSpPr>
+              <a:cxnSpLocks/>
               <a:stCxn id="7" idx="2"/>
+              <a:endCxn id="11" idx="0"/>
             </p:cNvCxnSpPr>
             <p:nvPr/>
           </p:nvCxnSpPr>
           <p:spPr>
-            <a:xfrm flipH="1">
-              <a:off x="1791848" y="2348880"/>
-              <a:ext cx="415720" cy="360040"/>
+            <a:xfrm rot="5400000">
+              <a:off x="1772442" y="2273794"/>
+              <a:ext cx="360040" cy="510213"/>
             </a:xfrm>
-            <a:prstGeom prst="straightConnector1">
-              <a:avLst/>
+            <a:prstGeom prst="bentConnector3">
+              <a:avLst>
+                <a:gd name="adj1" fmla="val 50000"/>
+              </a:avLst>
             </a:prstGeom>
             <a:ln>
               <a:solidFill>
@@ -9456,12 +9460,14 @@
             <p:nvPr/>
           </p:nvCxnSpPr>
           <p:spPr>
-            <a:xfrm flipH="1">
-              <a:off x="4253639" y="2342821"/>
-              <a:ext cx="2039241" cy="366099"/>
+            <a:xfrm rot="5400000">
+              <a:off x="5090211" y="1506250"/>
+              <a:ext cx="366099" cy="2039241"/>
             </a:xfrm>
-            <a:prstGeom prst="straightConnector1">
-              <a:avLst/>
+            <a:prstGeom prst="bentConnector3">
+              <a:avLst>
+                <a:gd name="adj1" fmla="val 50000"/>
+              </a:avLst>
             </a:prstGeom>
             <a:ln>
               <a:solidFill>
@@ -9508,10 +9514,10 @@
         </p:nvGrpSpPr>
         <p:grpSpPr>
           <a:xfrm>
-            <a:off x="7392144" y="2129122"/>
-            <a:ext cx="4453129" cy="528551"/>
-            <a:chOff x="7595853" y="2553795"/>
-            <a:chExt cx="4453129" cy="528551"/>
+            <a:off x="7416636" y="2248036"/>
+            <a:ext cx="4418668" cy="432048"/>
+            <a:chOff x="7595853" y="2672709"/>
+            <a:chExt cx="4418668" cy="432048"/>
           </a:xfrm>
         </p:grpSpPr>
         <p:sp>
@@ -9580,8 +9586,8 @@
           </p:nvSpPr>
           <p:spPr>
             <a:xfrm>
-              <a:off x="9168662" y="2553795"/>
-              <a:ext cx="2880320" cy="432048"/>
+              <a:off x="9435357" y="2672709"/>
+              <a:ext cx="2579164" cy="432048"/>
             </a:xfrm>
             <a:prstGeom prst="roundRect">
               <a:avLst/>
@@ -9632,8 +9638,8 @@
           </p:nvCxnSpPr>
           <p:spPr>
             <a:xfrm flipH="1">
-              <a:off x="7756197" y="2769819"/>
-              <a:ext cx="1412465" cy="132507"/>
+              <a:off x="7756197" y="2888733"/>
+              <a:ext cx="1679160" cy="13593"/>
             </a:xfrm>
             <a:prstGeom prst="straightConnector1">
               <a:avLst/>
@@ -9806,12 +9812,14 @@
             <p:nvPr/>
           </p:nvCxnSpPr>
           <p:spPr>
-            <a:xfrm flipH="1">
-              <a:off x="2647928" y="2348697"/>
-              <a:ext cx="3417778" cy="376551"/>
+            <a:xfrm rot="5400000">
+              <a:off x="4168542" y="828083"/>
+              <a:ext cx="376551" cy="3417778"/>
             </a:xfrm>
-            <a:prstGeom prst="straightConnector1">
-              <a:avLst/>
+            <a:prstGeom prst="bentConnector3">
+              <a:avLst>
+                <a:gd name="adj1" fmla="val 50000"/>
+              </a:avLst>
             </a:prstGeom>
             <a:ln>
               <a:solidFill>

</xml_diff>